<commit_message>
updated code and names
</commit_message>
<xml_diff>
--- a/backup/Project_Presentation.pptx
+++ b/backup/Project_Presentation.pptx
@@ -235,7 +235,7 @@
           <a:p>
             <a:fld id="{2427289A-3381-4DAD-A0D0-5038EA10A2D4}" type="datetimeFigureOut">
               <a:rPr lang="en-US" smtClean="0"/>
-              <a:t>11/20/2025</a:t>
+              <a:t>11/25/2025</a:t>
             </a:fld>
             <a:endParaRPr lang="en-US"/>
           </a:p>
@@ -2039,6 +2039,9 @@
             </a:r>
           </a:p>
           <a:p>
+            <a:br>
+              <a:rPr lang="en-US" dirty="0"/>
+            </a:br>
             <a:r>
               <a:rPr lang="en-US" dirty="0"/>
               <a:t>Finding 2: On average, correlations are low, suggesting diversification benefits. However, </a:t>
@@ -3665,7 +3668,7 @@
           <a:p>
             <a:fld id="{241EB5C9-1307-BA42-ABA2-0BC069CD8E7F}" type="datetimeFigureOut">
               <a:rPr lang="en-US" smtClean="0"/>
-              <a:t>11/20/2025</a:t>
+              <a:t>11/25/2025</a:t>
             </a:fld>
             <a:endParaRPr lang="en-US"/>
           </a:p>
@@ -3833,7 +3836,7 @@
           <a:p>
             <a:fld id="{241EB5C9-1307-BA42-ABA2-0BC069CD8E7F}" type="datetimeFigureOut">
               <a:rPr lang="en-US" smtClean="0"/>
-              <a:t>11/20/2025</a:t>
+              <a:t>11/25/2025</a:t>
             </a:fld>
             <a:endParaRPr lang="en-US"/>
           </a:p>
@@ -4011,7 +4014,7 @@
           <a:p>
             <a:fld id="{241EB5C9-1307-BA42-ABA2-0BC069CD8E7F}" type="datetimeFigureOut">
               <a:rPr lang="en-US" smtClean="0"/>
-              <a:t>11/20/2025</a:t>
+              <a:t>11/25/2025</a:t>
             </a:fld>
             <a:endParaRPr lang="en-US"/>
           </a:p>
@@ -4179,7 +4182,7 @@
           <a:p>
             <a:fld id="{241EB5C9-1307-BA42-ABA2-0BC069CD8E7F}" type="datetimeFigureOut">
               <a:rPr lang="en-US" smtClean="0"/>
-              <a:t>11/20/2025</a:t>
+              <a:t>11/25/2025</a:t>
             </a:fld>
             <a:endParaRPr lang="en-US"/>
           </a:p>
@@ -4424,7 +4427,7 @@
           <a:p>
             <a:fld id="{241EB5C9-1307-BA42-ABA2-0BC069CD8E7F}" type="datetimeFigureOut">
               <a:rPr lang="en-US" smtClean="0"/>
-              <a:t>11/20/2025</a:t>
+              <a:t>11/25/2025</a:t>
             </a:fld>
             <a:endParaRPr lang="en-US"/>
           </a:p>
@@ -4709,7 +4712,7 @@
           <a:p>
             <a:fld id="{241EB5C9-1307-BA42-ABA2-0BC069CD8E7F}" type="datetimeFigureOut">
               <a:rPr lang="en-US" smtClean="0"/>
-              <a:t>11/20/2025</a:t>
+              <a:t>11/25/2025</a:t>
             </a:fld>
             <a:endParaRPr lang="en-US"/>
           </a:p>
@@ -5128,7 +5131,7 @@
           <a:p>
             <a:fld id="{241EB5C9-1307-BA42-ABA2-0BC069CD8E7F}" type="datetimeFigureOut">
               <a:rPr lang="en-US" smtClean="0"/>
-              <a:t>11/20/2025</a:t>
+              <a:t>11/25/2025</a:t>
             </a:fld>
             <a:endParaRPr lang="en-US"/>
           </a:p>
@@ -5245,7 +5248,7 @@
           <a:p>
             <a:fld id="{241EB5C9-1307-BA42-ABA2-0BC069CD8E7F}" type="datetimeFigureOut">
               <a:rPr lang="en-US" smtClean="0"/>
-              <a:t>11/20/2025</a:t>
+              <a:t>11/25/2025</a:t>
             </a:fld>
             <a:endParaRPr lang="en-US"/>
           </a:p>
@@ -5340,7 +5343,7 @@
           <a:p>
             <a:fld id="{241EB5C9-1307-BA42-ABA2-0BC069CD8E7F}" type="datetimeFigureOut">
               <a:rPr lang="en-US" smtClean="0"/>
-              <a:t>11/20/2025</a:t>
+              <a:t>11/25/2025</a:t>
             </a:fld>
             <a:endParaRPr lang="en-US"/>
           </a:p>
@@ -5615,7 +5618,7 @@
           <a:p>
             <a:fld id="{241EB5C9-1307-BA42-ABA2-0BC069CD8E7F}" type="datetimeFigureOut">
               <a:rPr lang="en-US" smtClean="0"/>
-              <a:t>11/20/2025</a:t>
+              <a:t>11/25/2025</a:t>
             </a:fld>
             <a:endParaRPr lang="en-US"/>
           </a:p>
@@ -5867,7 +5870,7 @@
           <a:p>
             <a:fld id="{241EB5C9-1307-BA42-ABA2-0BC069CD8E7F}" type="datetimeFigureOut">
               <a:rPr lang="en-US" smtClean="0"/>
-              <a:t>11/20/2025</a:t>
+              <a:t>11/25/2025</a:t>
             </a:fld>
             <a:endParaRPr lang="en-US"/>
           </a:p>
@@ -6078,7 +6081,7 @@
           <a:p>
             <a:fld id="{241EB5C9-1307-BA42-ABA2-0BC069CD8E7F}" type="datetimeFigureOut">
               <a:rPr lang="en-US" smtClean="0"/>
-              <a:t>11/20/2025</a:t>
+              <a:t>11/25/2025</a:t>
             </a:fld>
             <a:endParaRPr lang="en-US"/>
           </a:p>

</xml_diff>